<commit_message>
4195 친구 네트워크 presentation.
</commit_message>
<xml_diff>
--- a/presentations/4195 친구 네트워크.pptx
+++ b/presentations/4195 친구 네트워크.pptx
@@ -109,6 +109,11 @@
       </a:defRPr>
     </a:lvl9pPr>
   </p:defaultTextStyle>
+  <p:extLst>
+    <p:ext uri="{EFAFB233-063F-42B5-8137-9DF3F51BA10A}">
+      <p15:sldGuideLst xmlns:p15="http://schemas.microsoft.com/office/powerpoint/2012/main"/>
+    </p:ext>
+  </p:extLst>
 </p:presentation>
 </file>
 
@@ -259,7 +264,7 @@
           <a:p>
             <a:fld id="{18F7BAC1-A659-48CB-98E8-CA9AA1FCF83A}" type="datetimeFigureOut">
               <a:rPr lang="ko-KR" altLang="en-US" smtClean="0"/>
-              <a:t>2020-06-15</a:t>
+              <a:t>2020-06-16</a:t>
             </a:fld>
             <a:endParaRPr lang="ko-KR" altLang="en-US"/>
           </a:p>
@@ -457,7 +462,7 @@
           <a:p>
             <a:fld id="{18F7BAC1-A659-48CB-98E8-CA9AA1FCF83A}" type="datetimeFigureOut">
               <a:rPr lang="ko-KR" altLang="en-US" smtClean="0"/>
-              <a:t>2020-06-15</a:t>
+              <a:t>2020-06-16</a:t>
             </a:fld>
             <a:endParaRPr lang="ko-KR" altLang="en-US"/>
           </a:p>
@@ -665,7 +670,7 @@
           <a:p>
             <a:fld id="{18F7BAC1-A659-48CB-98E8-CA9AA1FCF83A}" type="datetimeFigureOut">
               <a:rPr lang="ko-KR" altLang="en-US" smtClean="0"/>
-              <a:t>2020-06-15</a:t>
+              <a:t>2020-06-16</a:t>
             </a:fld>
             <a:endParaRPr lang="ko-KR" altLang="en-US"/>
           </a:p>
@@ -863,7 +868,7 @@
           <a:p>
             <a:fld id="{18F7BAC1-A659-48CB-98E8-CA9AA1FCF83A}" type="datetimeFigureOut">
               <a:rPr lang="ko-KR" altLang="en-US" smtClean="0"/>
-              <a:t>2020-06-15</a:t>
+              <a:t>2020-06-16</a:t>
             </a:fld>
             <a:endParaRPr lang="ko-KR" altLang="en-US"/>
           </a:p>
@@ -1138,7 +1143,7 @@
           <a:p>
             <a:fld id="{18F7BAC1-A659-48CB-98E8-CA9AA1FCF83A}" type="datetimeFigureOut">
               <a:rPr lang="ko-KR" altLang="en-US" smtClean="0"/>
-              <a:t>2020-06-15</a:t>
+              <a:t>2020-06-16</a:t>
             </a:fld>
             <a:endParaRPr lang="ko-KR" altLang="en-US"/>
           </a:p>
@@ -1403,7 +1408,7 @@
           <a:p>
             <a:fld id="{18F7BAC1-A659-48CB-98E8-CA9AA1FCF83A}" type="datetimeFigureOut">
               <a:rPr lang="ko-KR" altLang="en-US" smtClean="0"/>
-              <a:t>2020-06-15</a:t>
+              <a:t>2020-06-16</a:t>
             </a:fld>
             <a:endParaRPr lang="ko-KR" altLang="en-US"/>
           </a:p>
@@ -1815,7 +1820,7 @@
           <a:p>
             <a:fld id="{18F7BAC1-A659-48CB-98E8-CA9AA1FCF83A}" type="datetimeFigureOut">
               <a:rPr lang="ko-KR" altLang="en-US" smtClean="0"/>
-              <a:t>2020-06-15</a:t>
+              <a:t>2020-06-16</a:t>
             </a:fld>
             <a:endParaRPr lang="ko-KR" altLang="en-US"/>
           </a:p>
@@ -1956,7 +1961,7 @@
           <a:p>
             <a:fld id="{18F7BAC1-A659-48CB-98E8-CA9AA1FCF83A}" type="datetimeFigureOut">
               <a:rPr lang="ko-KR" altLang="en-US" smtClean="0"/>
-              <a:t>2020-06-15</a:t>
+              <a:t>2020-06-16</a:t>
             </a:fld>
             <a:endParaRPr lang="ko-KR" altLang="en-US"/>
           </a:p>
@@ -2069,7 +2074,7 @@
           <a:p>
             <a:fld id="{18F7BAC1-A659-48CB-98E8-CA9AA1FCF83A}" type="datetimeFigureOut">
               <a:rPr lang="ko-KR" altLang="en-US" smtClean="0"/>
-              <a:t>2020-06-15</a:t>
+              <a:t>2020-06-16</a:t>
             </a:fld>
             <a:endParaRPr lang="ko-KR" altLang="en-US"/>
           </a:p>
@@ -2380,7 +2385,7 @@
           <a:p>
             <a:fld id="{18F7BAC1-A659-48CB-98E8-CA9AA1FCF83A}" type="datetimeFigureOut">
               <a:rPr lang="ko-KR" altLang="en-US" smtClean="0"/>
-              <a:t>2020-06-15</a:t>
+              <a:t>2020-06-16</a:t>
             </a:fld>
             <a:endParaRPr lang="ko-KR" altLang="en-US"/>
           </a:p>
@@ -2668,7 +2673,7 @@
           <a:p>
             <a:fld id="{18F7BAC1-A659-48CB-98E8-CA9AA1FCF83A}" type="datetimeFigureOut">
               <a:rPr lang="ko-KR" altLang="en-US" smtClean="0"/>
-              <a:t>2020-06-15</a:t>
+              <a:t>2020-06-16</a:t>
             </a:fld>
             <a:endParaRPr lang="ko-KR" altLang="en-US"/>
           </a:p>
@@ -2909,7 +2914,7 @@
           <a:p>
             <a:fld id="{18F7BAC1-A659-48CB-98E8-CA9AA1FCF83A}" type="datetimeFigureOut">
               <a:rPr lang="ko-KR" altLang="en-US" smtClean="0"/>
-              <a:t>2020-06-15</a:t>
+              <a:t>2020-06-16</a:t>
             </a:fld>
             <a:endParaRPr lang="ko-KR" altLang="en-US"/>
           </a:p>
@@ -4035,15 +4040,7 @@
             </a:pPr>
             <a:r>
               <a:rPr lang="en-US" altLang="ko-KR" dirty="0"/>
-              <a:t>        return root[x] = </a:t>
-            </a:r>
-            <a:r>
-              <a:rPr lang="en-US" altLang="ko-KR" dirty="0" err="1">
-                <a:solidFill>
-                  <a:srgbClr val="FF0000"/>
-                </a:solidFill>
-              </a:rPr>
-              <a:t>find_set</a:t>
+              <a:t>        return </a:t>
             </a:r>
             <a:r>
               <a:rPr lang="en-US" altLang="ko-KR" dirty="0">
@@ -4051,23 +4048,15 @@
                   <a:srgbClr val="FF0000"/>
                 </a:solidFill>
               </a:rPr>
-              <a:t>(</a:t>
-            </a:r>
-            <a:r>
-              <a:rPr lang="en-US" altLang="ko-KR" dirty="0"/>
-              <a:t>root[x]</a:t>
-            </a:r>
-            <a:r>
-              <a:rPr lang="en-US" altLang="ko-KR" dirty="0">
-                <a:solidFill>
-                  <a:srgbClr val="FF0000"/>
-                </a:solidFill>
-              </a:rPr>
-              <a:t>)</a:t>
-            </a:r>
-            <a:r>
-              <a:rPr lang="en-US" altLang="ko-KR" dirty="0"/>
-              <a:t>;</a:t>
+              <a:t>root[x] = </a:t>
+            </a:r>
+            <a:r>
+              <a:rPr lang="en-US" altLang="ko-KR" dirty="0" err="1"/>
+              <a:t>find_set</a:t>
+            </a:r>
+            <a:r>
+              <a:rPr lang="en-US" altLang="ko-KR" dirty="0"/>
+              <a:t>(root[x]);</a:t>
             </a:r>
           </a:p>
           <a:p>

</xml_diff>